<commit_message>
Second view on prezentation
This is the second look at the presentation on our project, I'm waiting for your criticism
</commit_message>
<xml_diff>
--- a/СервисМечты.pptx
+++ b/СервисМечты.pptx
@@ -110,6 +110,11 @@
       </a:defRPr>
     </a:lvl9pPr>
   </p:defaultTextStyle>
+  <p:extLst>
+    <p:ext uri="{EFAFB233-063F-42B5-8137-9DF3F51BA10A}">
+      <p15:sldGuideLst xmlns:p15="http://schemas.microsoft.com/office/powerpoint/2012/main"/>
+    </p:ext>
+  </p:extLst>
 </p:presentation>
 </file>
 
@@ -141,11 +146,11 @@
         <a:lstStyle/>
         <a:p>
           <a:pPr>
-            <a:defRPr sz="1862" b="0" i="0" u="none" strike="noStrike" kern="1200" spc="0" baseline="0">
+            <a:defRPr sz="2200" b="1" i="0" u="none" strike="noStrike" kern="1200" baseline="0">
               <a:solidFill>
-                <a:schemeClr val="tx1">
-                  <a:lumMod val="65000"/>
-                  <a:lumOff val="35000"/>
+                <a:schemeClr val="dk1">
+                  <a:lumMod val="75000"/>
+                  <a:lumOff val="25000"/>
                 </a:schemeClr>
               </a:solidFill>
               <a:latin typeface="+mn-lt"/>
@@ -159,7 +164,7 @@
     </c:title>
     <c:autoTitleDeleted val="0"/>
     <c:view3D>
-      <c:rotX val="30"/>
+      <c:rotX val="50"/>
       <c:rotY val="0"/>
       <c:depthPercent val="100"/>
       <c:rAngAx val="0"/>
@@ -222,18 +227,23 @@
               <a:solidFill>
                 <a:schemeClr val="accent1"/>
               </a:solidFill>
-              <a:ln w="25400">
-                <a:solidFill>
-                  <a:schemeClr val="lt1"/>
-                </a:solidFill>
+              <a:ln>
+                <a:noFill/>
               </a:ln>
-              <a:effectLst/>
-              <a:sp3d contourW="25400">
-                <a:contourClr>
-                  <a:schemeClr val="lt1"/>
-                </a:contourClr>
-              </a:sp3d>
+              <a:effectLst>
+                <a:outerShdw blurRad="254000" sx="102000" sy="102000" algn="ctr" rotWithShape="0">
+                  <a:prstClr val="black">
+                    <a:alpha val="20000"/>
+                  </a:prstClr>
+                </a:outerShdw>
+              </a:effectLst>
+              <a:sp3d/>
             </c:spPr>
+            <c:extLst>
+              <c:ext xmlns:c16="http://schemas.microsoft.com/office/drawing/2014/chart" uri="{C3380CC4-5D6E-409C-BE32-E72D297353CC}">
+                <c16:uniqueId val="{00000001-77CB-44C8-A20B-2CD3F0490261}"/>
+              </c:ext>
+            </c:extLst>
           </c:dPt>
           <c:dPt>
             <c:idx val="1"/>
@@ -242,19 +252,95 @@
               <a:solidFill>
                 <a:schemeClr val="accent2"/>
               </a:solidFill>
-              <a:ln w="25400">
-                <a:solidFill>
-                  <a:schemeClr val="lt1"/>
-                </a:solidFill>
+              <a:ln>
+                <a:noFill/>
               </a:ln>
-              <a:effectLst/>
-              <a:sp3d contourW="25400">
-                <a:contourClr>
-                  <a:schemeClr val="lt1"/>
-                </a:contourClr>
-              </a:sp3d>
+              <a:effectLst>
+                <a:outerShdw blurRad="254000" sx="102000" sy="102000" algn="ctr" rotWithShape="0">
+                  <a:prstClr val="black">
+                    <a:alpha val="20000"/>
+                  </a:prstClr>
+                </a:outerShdw>
+              </a:effectLst>
+              <a:sp3d/>
             </c:spPr>
+            <c:extLst>
+              <c:ext xmlns:c16="http://schemas.microsoft.com/office/drawing/2014/chart" uri="{C3380CC4-5D6E-409C-BE32-E72D297353CC}">
+                <c16:uniqueId val="{00000003-77CB-44C8-A20B-2CD3F0490261}"/>
+              </c:ext>
+            </c:extLst>
           </c:dPt>
+          <c:dLbls>
+            <c:spPr>
+              <a:pattFill prst="pct75">
+                <a:fgClr>
+                  <a:schemeClr val="dk1">
+                    <a:lumMod val="75000"/>
+                    <a:lumOff val="25000"/>
+                  </a:schemeClr>
+                </a:fgClr>
+                <a:bgClr>
+                  <a:schemeClr val="dk1">
+                    <a:lumMod val="65000"/>
+                    <a:lumOff val="35000"/>
+                  </a:schemeClr>
+                </a:bgClr>
+              </a:pattFill>
+              <a:ln>
+                <a:noFill/>
+              </a:ln>
+              <a:effectLst>
+                <a:outerShdw blurRad="50800" dist="38100" dir="2700000" algn="tl" rotWithShape="0">
+                  <a:prstClr val="black">
+                    <a:alpha val="40000"/>
+                  </a:prstClr>
+                </a:outerShdw>
+              </a:effectLst>
+            </c:spPr>
+            <c:txPr>
+              <a:bodyPr rot="0" spcFirstLastPara="1" vertOverflow="ellipsis" vert="horz" wrap="square" lIns="38100" tIns="19050" rIns="38100" bIns="19050" anchor="ctr" anchorCtr="1">
+                <a:spAutoFit/>
+              </a:bodyPr>
+              <a:lstStyle/>
+              <a:p>
+                <a:pPr>
+                  <a:defRPr sz="1330" b="1" i="0" u="none" strike="noStrike" kern="1200" baseline="0">
+                    <a:solidFill>
+                      <a:schemeClr val="lt1"/>
+                    </a:solidFill>
+                    <a:latin typeface="+mn-lt"/>
+                    <a:ea typeface="+mn-ea"/>
+                    <a:cs typeface="+mn-cs"/>
+                  </a:defRPr>
+                </a:pPr>
+                <a:endParaRPr lang="ru-RU"/>
+              </a:p>
+            </c:txPr>
+            <c:dLblPos val="ctr"/>
+            <c:showLegendKey val="0"/>
+            <c:showVal val="0"/>
+            <c:showCatName val="0"/>
+            <c:showSerName val="0"/>
+            <c:showPercent val="1"/>
+            <c:showBubbleSize val="0"/>
+            <c:showLeaderLines val="1"/>
+            <c:leaderLines>
+              <c:spPr>
+                <a:ln w="9525">
+                  <a:solidFill>
+                    <a:schemeClr val="dk1">
+                      <a:lumMod val="50000"/>
+                      <a:lumOff val="50000"/>
+                    </a:schemeClr>
+                  </a:solidFill>
+                </a:ln>
+                <a:effectLst/>
+              </c:spPr>
+            </c:leaderLines>
+            <c:extLst>
+              <c:ext xmlns:c15="http://schemas.microsoft.com/office/drawing/2012/chart" uri="{CE6537A1-D6FC-4f65-9D91-7224C49458BB}"/>
+            </c:extLst>
+          </c:dLbls>
           <c:cat>
             <c:strRef>
               <c:f>Лист1!$A$2:$A$3</c:f>
@@ -291,11 +377,12 @@
           </c:extLst>
         </c:ser>
         <c:dLbls>
+          <c:dLblPos val="ctr"/>
           <c:showLegendKey val="0"/>
           <c:showVal val="0"/>
           <c:showCatName val="0"/>
           <c:showSerName val="0"/>
-          <c:showPercent val="0"/>
+          <c:showPercent val="1"/>
           <c:showBubbleSize val="0"/>
           <c:showLeaderLines val="1"/>
         </c:dLbls>
@@ -309,10 +396,15 @@
       </c:spPr>
     </c:plotArea>
     <c:legend>
-      <c:legendPos val="b"/>
+      <c:legendPos val="r"/>
       <c:overlay val="0"/>
       <c:spPr>
-        <a:noFill/>
+        <a:solidFill>
+          <a:schemeClr val="lt1">
+            <a:lumMod val="95000"/>
+            <a:alpha val="39000"/>
+          </a:schemeClr>
+        </a:solidFill>
         <a:ln>
           <a:noFill/>
         </a:ln>
@@ -325,9 +417,9 @@
           <a:pPr>
             <a:defRPr sz="1197" b="0" i="0" u="none" strike="noStrike" kern="1200" baseline="0">
               <a:solidFill>
-                <a:schemeClr val="tx1">
-                  <a:lumMod val="65000"/>
-                  <a:lumOff val="35000"/>
+                <a:schemeClr val="dk1">
+                  <a:lumMod val="75000"/>
+                  <a:lumOff val="25000"/>
                 </a:schemeClr>
               </a:solidFill>
               <a:latin typeface="+mn-lt"/>
@@ -351,9 +443,33 @@
     <c:showDLblsOverMax val="0"/>
   </c:chart>
   <c:spPr>
-    <a:noFill/>
-    <a:ln>
-      <a:noFill/>
+    <a:gradFill flip="none" rotWithShape="1">
+      <a:gsLst>
+        <a:gs pos="0">
+          <a:schemeClr val="lt1"/>
+        </a:gs>
+        <a:gs pos="39000">
+          <a:schemeClr val="lt1"/>
+        </a:gs>
+        <a:gs pos="100000">
+          <a:schemeClr val="lt1">
+            <a:lumMod val="75000"/>
+          </a:schemeClr>
+        </a:gs>
+      </a:gsLst>
+      <a:path path="circle">
+        <a:fillToRect l="50000" t="-80000" r="50000" b="180000"/>
+      </a:path>
+      <a:tileRect/>
+    </a:gradFill>
+    <a:ln w="9525" cap="flat" cmpd="sng" algn="ctr">
+      <a:solidFill>
+        <a:schemeClr val="dk1">
+          <a:lumMod val="25000"/>
+          <a:lumOff val="75000"/>
+        </a:schemeClr>
+      </a:solidFill>
+      <a:round/>
     </a:ln>
     <a:effectLst/>
   </c:spPr>
@@ -414,58 +530,74 @@
 </file>
 
 <file path=ppt/charts/style1.xml><?xml version="1.0" encoding="utf-8"?>
-<cs:chartStyle xmlns:cs="http://schemas.microsoft.com/office/drawing/2012/chartStyle" xmlns:a="http://schemas.openxmlformats.org/drawingml/2006/main" id="262">
+<cs:chartStyle xmlns:cs="http://schemas.microsoft.com/office/drawing/2012/chartStyle" xmlns:a="http://schemas.openxmlformats.org/drawingml/2006/main" id="264">
   <cs:axisTitle>
     <cs:lnRef idx="0"/>
     <cs:fillRef idx="0"/>
     <cs:effectRef idx="0"/>
     <cs:fontRef idx="minor">
-      <a:schemeClr val="tx1">
-        <a:lumMod val="65000"/>
-        <a:lumOff val="35000"/>
+      <a:schemeClr val="dk1">
+        <a:lumMod val="75000"/>
+        <a:lumOff val="25000"/>
       </a:schemeClr>
     </cs:fontRef>
-    <cs:defRPr sz="1330" kern="1200"/>
+    <cs:defRPr sz="1197" b="1" kern="1200"/>
   </cs:axisTitle>
   <cs:categoryAxis>
     <cs:lnRef idx="0"/>
     <cs:fillRef idx="0"/>
     <cs:effectRef idx="0"/>
     <cs:fontRef idx="minor">
-      <a:schemeClr val="tx1">
-        <a:lumMod val="65000"/>
-        <a:lumOff val="35000"/>
+      <a:schemeClr val="dk1">
+        <a:lumMod val="75000"/>
+        <a:lumOff val="25000"/>
       </a:schemeClr>
     </cs:fontRef>
     <cs:spPr>
-      <a:ln w="9525" cap="flat" cmpd="sng" algn="ctr">
+      <a:ln w="19050" cap="flat" cmpd="sng" algn="ctr">
         <a:solidFill>
-          <a:schemeClr val="tx1">
-            <a:lumMod val="15000"/>
-            <a:lumOff val="85000"/>
+          <a:schemeClr val="dk1">
+            <a:lumMod val="75000"/>
+            <a:lumOff val="25000"/>
           </a:schemeClr>
         </a:solidFill>
         <a:round/>
       </a:ln>
     </cs:spPr>
-    <cs:defRPr sz="1197" kern="1200"/>
+    <cs:defRPr sz="1197" kern="1200" cap="all" baseline="0"/>
   </cs:categoryAxis>
-  <cs:chartArea mods="allowNoFillOverride allowNoLineOverride">
+  <cs:chartArea>
     <cs:lnRef idx="0"/>
     <cs:fillRef idx="0"/>
     <cs:effectRef idx="0"/>
     <cs:fontRef idx="minor">
-      <a:schemeClr val="tx1"/>
+      <a:schemeClr val="dk1"/>
     </cs:fontRef>
     <cs:spPr>
-      <a:solidFill>
-        <a:schemeClr val="bg1"/>
-      </a:solidFill>
+      <a:gradFill flip="none" rotWithShape="1">
+        <a:gsLst>
+          <a:gs pos="0">
+            <a:schemeClr val="lt1"/>
+          </a:gs>
+          <a:gs pos="39000">
+            <a:schemeClr val="lt1"/>
+          </a:gs>
+          <a:gs pos="100000">
+            <a:schemeClr val="lt1">
+              <a:lumMod val="75000"/>
+            </a:schemeClr>
+          </a:gs>
+        </a:gsLst>
+        <a:path path="circle">
+          <a:fillToRect l="50000" t="-80000" r="50000" b="180000"/>
+        </a:path>
+        <a:tileRect/>
+      </a:gradFill>
       <a:ln w="9525" cap="flat" cmpd="sng" algn="ctr">
         <a:solidFill>
-          <a:schemeClr val="tx1">
-            <a:lumMod val="15000"/>
-            <a:lumOff val="85000"/>
+          <a:schemeClr val="dk1">
+            <a:lumMod val="25000"/>
+            <a:lumOff val="75000"/>
           </a:schemeClr>
         </a:solidFill>
         <a:round/>
@@ -478,73 +610,110 @@
     <cs:fillRef idx="0"/>
     <cs:effectRef idx="0"/>
     <cs:fontRef idx="minor">
-      <a:schemeClr val="tx1">
-        <a:lumMod val="75000"/>
-        <a:lumOff val="25000"/>
-      </a:schemeClr>
+      <a:schemeClr val="lt1"/>
     </cs:fontRef>
-    <cs:defRPr sz="1197" kern="1200"/>
+    <cs:spPr>
+      <a:pattFill prst="pct75">
+        <a:fgClr>
+          <a:schemeClr val="dk1">
+            <a:lumMod val="75000"/>
+            <a:lumOff val="25000"/>
+          </a:schemeClr>
+        </a:fgClr>
+        <a:bgClr>
+          <a:schemeClr val="dk1">
+            <a:lumMod val="65000"/>
+            <a:lumOff val="35000"/>
+          </a:schemeClr>
+        </a:bgClr>
+      </a:pattFill>
+      <a:effectLst>
+        <a:outerShdw blurRad="50800" dist="38100" dir="2700000" algn="tl" rotWithShape="0">
+          <a:prstClr val="black">
+            <a:alpha val="40000"/>
+          </a:prstClr>
+        </a:outerShdw>
+      </a:effectLst>
+    </cs:spPr>
+    <cs:defRPr sz="1330" b="1" i="0" u="none" strike="noStrike" kern="1200" baseline="0"/>
   </cs:dataLabel>
   <cs:dataLabelCallout>
     <cs:lnRef idx="0"/>
     <cs:fillRef idx="0"/>
     <cs:effectRef idx="0"/>
     <cs:fontRef idx="minor">
-      <a:schemeClr val="dk1">
-        <a:lumMod val="65000"/>
-        <a:lumOff val="35000"/>
-      </a:schemeClr>
+      <a:schemeClr val="lt1"/>
     </cs:fontRef>
     <cs:spPr>
-      <a:solidFill>
-        <a:schemeClr val="lt1"/>
-      </a:solidFill>
-      <a:ln>
-        <a:solidFill>
+      <a:pattFill prst="pct75">
+        <a:fgClr>
           <a:schemeClr val="dk1">
-            <a:lumMod val="25000"/>
-            <a:lumOff val="75000"/>
+            <a:lumMod val="75000"/>
+            <a:lumOff val="25000"/>
           </a:schemeClr>
-        </a:solidFill>
-      </a:ln>
+        </a:fgClr>
+        <a:bgClr>
+          <a:schemeClr val="dk1">
+            <a:lumMod val="65000"/>
+            <a:lumOff val="35000"/>
+          </a:schemeClr>
+        </a:bgClr>
+      </a:pattFill>
+      <a:effectLst>
+        <a:outerShdw blurRad="50800" dist="38100" dir="2700000" algn="tl" rotWithShape="0">
+          <a:prstClr val="black">
+            <a:alpha val="40000"/>
+          </a:prstClr>
+        </a:outerShdw>
+      </a:effectLst>
     </cs:spPr>
-    <cs:defRPr sz="1197" kern="1200"/>
+    <cs:defRPr sz="1330" b="1" i="0" u="none" strike="noStrike" kern="1200" baseline="0"/>
     <cs:bodyPr rot="0" spcFirstLastPara="1" vertOverflow="clip" horzOverflow="clip" vert="horz" wrap="square" lIns="36576" tIns="18288" rIns="36576" bIns="18288" anchor="ctr" anchorCtr="1">
       <a:spAutoFit/>
     </cs:bodyPr>
   </cs:dataLabelCallout>
   <cs:dataPoint>
     <cs:lnRef idx="0"/>
-    <cs:fillRef idx="1">
+    <cs:fillRef idx="0">
       <cs:styleClr val="auto"/>
     </cs:fillRef>
     <cs:effectRef idx="0"/>
     <cs:fontRef idx="minor">
-      <a:schemeClr val="tx1"/>
+      <a:schemeClr val="dk1"/>
     </cs:fontRef>
     <cs:spPr>
-      <a:ln w="19050">
-        <a:solidFill>
-          <a:schemeClr val="lt1"/>
-        </a:solidFill>
-      </a:ln>
+      <a:solidFill>
+        <a:schemeClr val="phClr"/>
+      </a:solidFill>
+      <a:effectLst>
+        <a:outerShdw blurRad="254000" sx="102000" sy="102000" algn="ctr" rotWithShape="0">
+          <a:prstClr val="black">
+            <a:alpha val="20000"/>
+          </a:prstClr>
+        </a:outerShdw>
+      </a:effectLst>
     </cs:spPr>
   </cs:dataPoint>
   <cs:dataPoint3D>
     <cs:lnRef idx="0"/>
-    <cs:fillRef idx="1">
+    <cs:fillRef idx="0">
       <cs:styleClr val="auto"/>
     </cs:fillRef>
     <cs:effectRef idx="0"/>
     <cs:fontRef idx="minor">
-      <a:schemeClr val="tx1"/>
+      <a:schemeClr val="dk1"/>
     </cs:fontRef>
     <cs:spPr>
-      <a:ln w="25400">
-        <a:solidFill>
-          <a:schemeClr val="lt1"/>
-        </a:solidFill>
-      </a:ln>
+      <a:solidFill>
+        <a:schemeClr val="phClr"/>
+      </a:solidFill>
+      <a:effectLst>
+        <a:outerShdw blurRad="254000" sx="102000" sy="102000" algn="ctr" rotWithShape="0">
+          <a:prstClr val="black">
+            <a:alpha val="20000"/>
+          </a:prstClr>
+        </a:outerShdw>
+      </a:effectLst>
     </cs:spPr>
   </cs:dataPoint3D>
   <cs:dataPointLine>
@@ -554,37 +723,37 @@
     <cs:fillRef idx="0"/>
     <cs:effectRef idx="0"/>
     <cs:fontRef idx="minor">
-      <a:schemeClr val="tx1"/>
+      <a:schemeClr val="dk1"/>
     </cs:fontRef>
     <cs:spPr>
-      <a:ln w="28575" cap="rnd">
+      <a:ln w="31750" cap="rnd">
         <a:solidFill>
-          <a:schemeClr val="phClr"/>
+          <a:schemeClr val="phClr">
+            <a:alpha val="85000"/>
+          </a:schemeClr>
         </a:solidFill>
         <a:round/>
       </a:ln>
     </cs:spPr>
   </cs:dataPointLine>
   <cs:dataPointMarker>
-    <cs:lnRef idx="0">
-      <cs:styleClr val="auto"/>
-    </cs:lnRef>
-    <cs:fillRef idx="1">
+    <cs:lnRef idx="0"/>
+    <cs:fillRef idx="0">
       <cs:styleClr val="auto"/>
     </cs:fillRef>
     <cs:effectRef idx="0"/>
     <cs:fontRef idx="minor">
-      <a:schemeClr val="tx1"/>
+      <a:schemeClr val="dk1"/>
     </cs:fontRef>
     <cs:spPr>
-      <a:ln w="9525">
-        <a:solidFill>
-          <a:schemeClr val="phClr"/>
-        </a:solidFill>
-      </a:ln>
+      <a:solidFill>
+        <a:schemeClr val="phClr">
+          <a:alpha val="85000"/>
+        </a:schemeClr>
+      </a:solidFill>
     </cs:spPr>
   </cs:dataPointMarker>
-  <cs:dataPointMarkerLayout symbol="circle" size="5"/>
+  <cs:dataPointMarkerLayout symbol="circle" size="6"/>
   <cs:dataPointWireframe>
     <cs:lnRef idx="0">
       <cs:styleClr val="auto"/>
@@ -592,7 +761,7 @@
     <cs:fillRef idx="0"/>
     <cs:effectRef idx="0"/>
     <cs:fontRef idx="minor">
-      <a:schemeClr val="tx1"/>
+      <a:schemeClr val="dk1"/>
     </cs:fontRef>
     <cs:spPr>
       <a:ln w="9525" cap="rnd">
@@ -608,21 +777,19 @@
     <cs:fillRef idx="0"/>
     <cs:effectRef idx="0"/>
     <cs:fontRef idx="minor">
-      <a:schemeClr val="tx1">
-        <a:lumMod val="65000"/>
-        <a:lumOff val="35000"/>
+      <a:schemeClr val="dk1">
+        <a:lumMod val="75000"/>
+        <a:lumOff val="25000"/>
       </a:schemeClr>
     </cs:fontRef>
     <cs:spPr>
-      <a:noFill/>
-      <a:ln w="9525" cap="flat" cmpd="sng" algn="ctr">
+      <a:ln w="9525">
         <a:solidFill>
-          <a:schemeClr val="tx1">
-            <a:lumMod val="15000"/>
-            <a:lumOff val="85000"/>
+          <a:schemeClr val="dk1">
+            <a:lumMod val="35000"/>
+            <a:lumOff val="65000"/>
           </a:schemeClr>
         </a:solidFill>
-        <a:round/>
       </a:ln>
     </cs:spPr>
     <cs:defRPr sz="1197" kern="1200"/>
@@ -632,23 +799,22 @@
     <cs:fillRef idx="0"/>
     <cs:effectRef idx="0"/>
     <cs:fontRef idx="minor">
-      <a:schemeClr val="tx1"/>
+      <a:schemeClr val="dk1"/>
     </cs:fontRef>
     <cs:spPr>
       <a:solidFill>
         <a:schemeClr val="dk1">
-          <a:lumMod val="75000"/>
-          <a:lumOff val="25000"/>
+          <a:lumMod val="50000"/>
+          <a:lumOff val="50000"/>
         </a:schemeClr>
       </a:solidFill>
-      <a:ln w="9525" cap="flat" cmpd="sng" algn="ctr">
+      <a:ln w="9525">
         <a:solidFill>
-          <a:schemeClr val="tx1">
+          <a:schemeClr val="dk1">
             <a:lumMod val="65000"/>
             <a:lumOff val="35000"/>
           </a:schemeClr>
         </a:solidFill>
-        <a:round/>
       </a:ln>
     </cs:spPr>
   </cs:downBar>
@@ -657,17 +823,17 @@
     <cs:fillRef idx="0"/>
     <cs:effectRef idx="0"/>
     <cs:fontRef idx="minor">
-      <a:schemeClr val="tx1"/>
+      <a:schemeClr val="dk1"/>
     </cs:fontRef>
     <cs:spPr>
-      <a:ln w="9525" cap="flat" cmpd="sng" algn="ctr">
+      <a:ln w="9525">
         <a:solidFill>
-          <a:schemeClr val="tx1">
+          <a:schemeClr val="dk1">
             <a:lumMod val="35000"/>
             <a:lumOff val="65000"/>
           </a:schemeClr>
         </a:solidFill>
-        <a:round/>
+        <a:prstDash val="dash"/>
       </a:ln>
     </cs:spPr>
   </cs:dropLine>
@@ -676,12 +842,12 @@
     <cs:fillRef idx="0"/>
     <cs:effectRef idx="0"/>
     <cs:fontRef idx="minor">
-      <a:schemeClr val="tx1"/>
+      <a:schemeClr val="dk1"/>
     </cs:fontRef>
     <cs:spPr>
-      <a:ln w="9525" cap="flat" cmpd="sng" algn="ctr">
+      <a:ln w="9525">
         <a:solidFill>
-          <a:schemeClr val="tx1">
+          <a:schemeClr val="dk1">
             <a:lumMod val="65000"/>
             <a:lumOff val="35000"/>
           </a:schemeClr>
@@ -695,30 +861,36 @@
     <cs:fillRef idx="0"/>
     <cs:effectRef idx="0"/>
     <cs:fontRef idx="minor">
-      <a:schemeClr val="tx1"/>
+      <a:schemeClr val="dk1"/>
     </cs:fontRef>
-    <cs:spPr>
-      <a:noFill/>
-      <a:ln>
-        <a:noFill/>
-      </a:ln>
-    </cs:spPr>
   </cs:floor>
   <cs:gridlineMajor>
     <cs:lnRef idx="0"/>
     <cs:fillRef idx="0"/>
     <cs:effectRef idx="0"/>
     <cs:fontRef idx="minor">
-      <a:schemeClr val="tx1"/>
+      <a:schemeClr val="dk1"/>
     </cs:fontRef>
     <cs:spPr>
       <a:ln w="9525" cap="flat" cmpd="sng" algn="ctr">
-        <a:solidFill>
-          <a:schemeClr val="tx1">
-            <a:lumMod val="15000"/>
-            <a:lumOff val="85000"/>
-          </a:schemeClr>
-        </a:solidFill>
+        <a:gradFill>
+          <a:gsLst>
+            <a:gs pos="100000">
+              <a:schemeClr val="dk1">
+                <a:lumMod val="95000"/>
+                <a:lumOff val="5000"/>
+                <a:alpha val="42000"/>
+              </a:schemeClr>
+            </a:gs>
+            <a:gs pos="0">
+              <a:schemeClr val="lt1">
+                <a:lumMod val="75000"/>
+                <a:alpha val="36000"/>
+              </a:schemeClr>
+            </a:gs>
+          </a:gsLst>
+          <a:lin ang="5400000" scaled="0"/>
+        </a:gradFill>
         <a:round/>
       </a:ln>
     </cs:spPr>
@@ -728,17 +900,28 @@
     <cs:fillRef idx="0"/>
     <cs:effectRef idx="0"/>
     <cs:fontRef idx="minor">
-      <a:schemeClr val="tx1"/>
+      <a:schemeClr val="dk1"/>
     </cs:fontRef>
     <cs:spPr>
-      <a:ln w="9525" cap="flat" cmpd="sng" algn="ctr">
-        <a:solidFill>
-          <a:schemeClr val="tx1">
-            <a:lumMod val="5000"/>
-            <a:lumOff val="95000"/>
-          </a:schemeClr>
-        </a:solidFill>
-        <a:round/>
+      <a:ln>
+        <a:gradFill>
+          <a:gsLst>
+            <a:gs pos="100000">
+              <a:schemeClr val="dk1">
+                <a:lumMod val="95000"/>
+                <a:lumOff val="5000"/>
+                <a:alpha val="42000"/>
+              </a:schemeClr>
+            </a:gs>
+            <a:gs pos="0">
+              <a:schemeClr val="lt1">
+                <a:lumMod val="75000"/>
+                <a:alpha val="36000"/>
+              </a:schemeClr>
+            </a:gs>
+          </a:gsLst>
+          <a:lin ang="5400000" scaled="0"/>
+        </a:gradFill>
       </a:ln>
     </cs:spPr>
   </cs:gridlineMinor>
@@ -747,17 +930,17 @@
     <cs:fillRef idx="0"/>
     <cs:effectRef idx="0"/>
     <cs:fontRef idx="minor">
-      <a:schemeClr val="tx1"/>
+      <a:schemeClr val="dk1"/>
     </cs:fontRef>
     <cs:spPr>
-      <a:ln w="9525" cap="flat" cmpd="sng" algn="ctr">
+      <a:ln w="9525">
         <a:solidFill>
-          <a:schemeClr val="tx1">
-            <a:lumMod val="50000"/>
-            <a:lumOff val="50000"/>
+          <a:schemeClr val="dk1">
+            <a:lumMod val="35000"/>
+            <a:lumOff val="65000"/>
           </a:schemeClr>
         </a:solidFill>
-        <a:round/>
+        <a:prstDash val="dash"/>
       </a:ln>
     </cs:spPr>
   </cs:hiLoLine>
@@ -766,17 +949,16 @@
     <cs:fillRef idx="0"/>
     <cs:effectRef idx="0"/>
     <cs:fontRef idx="minor">
-      <a:schemeClr val="tx1"/>
+      <a:schemeClr val="dk1"/>
     </cs:fontRef>
     <cs:spPr>
-      <a:ln w="9525" cap="flat" cmpd="sng" algn="ctr">
+      <a:ln w="9525">
         <a:solidFill>
-          <a:schemeClr val="tx1">
-            <a:lumMod val="35000"/>
-            <a:lumOff val="65000"/>
+          <a:schemeClr val="dk1">
+            <a:lumMod val="50000"/>
+            <a:lumOff val="50000"/>
           </a:schemeClr>
         </a:solidFill>
-        <a:round/>
       </a:ln>
     </cs:spPr>
   </cs:leaderLine>
@@ -785,27 +967,35 @@
     <cs:fillRef idx="0"/>
     <cs:effectRef idx="0"/>
     <cs:fontRef idx="minor">
-      <a:schemeClr val="tx1">
-        <a:lumMod val="65000"/>
-        <a:lumOff val="35000"/>
+      <a:schemeClr val="dk1">
+        <a:lumMod val="75000"/>
+        <a:lumOff val="25000"/>
       </a:schemeClr>
     </cs:fontRef>
+    <cs:spPr>
+      <a:solidFill>
+        <a:schemeClr val="lt1">
+          <a:lumMod val="95000"/>
+          <a:alpha val="39000"/>
+        </a:schemeClr>
+      </a:solidFill>
+    </cs:spPr>
     <cs:defRPr sz="1197" kern="1200"/>
   </cs:legend>
-  <cs:plotArea mods="allowNoFillOverride allowNoLineOverride">
+  <cs:plotArea>
     <cs:lnRef idx="0"/>
     <cs:fillRef idx="0"/>
     <cs:effectRef idx="0"/>
     <cs:fontRef idx="minor">
-      <a:schemeClr val="tx1"/>
+      <a:schemeClr val="dk1"/>
     </cs:fontRef>
   </cs:plotArea>
-  <cs:plotArea3D mods="allowNoFillOverride allowNoLineOverride">
+  <cs:plotArea3D>
     <cs:lnRef idx="0"/>
     <cs:fillRef idx="0"/>
     <cs:effectRef idx="0"/>
     <cs:fontRef idx="minor">
-      <a:schemeClr val="tx1"/>
+      <a:schemeClr val="dk1"/>
     </cs:fontRef>
   </cs:plotArea3D>
   <cs:seriesAxis>
@@ -813,11 +1003,22 @@
     <cs:fillRef idx="0"/>
     <cs:effectRef idx="0"/>
     <cs:fontRef idx="minor">
-      <a:schemeClr val="tx1">
-        <a:lumMod val="65000"/>
-        <a:lumOff val="35000"/>
+      <a:schemeClr val="dk1">
+        <a:lumMod val="75000"/>
+        <a:lumOff val="25000"/>
       </a:schemeClr>
     </cs:fontRef>
+    <cs:spPr>
+      <a:ln w="31750" cap="flat" cmpd="sng" algn="ctr">
+        <a:solidFill>
+          <a:schemeClr val="dk1">
+            <a:lumMod val="75000"/>
+            <a:lumOff val="25000"/>
+          </a:schemeClr>
+        </a:solidFill>
+        <a:round/>
+      </a:ln>
+    </cs:spPr>
     <cs:defRPr sz="1197" kern="1200"/>
   </cs:seriesAxis>
   <cs:seriesLine>
@@ -825,14 +1026,14 @@
     <cs:fillRef idx="0"/>
     <cs:effectRef idx="0"/>
     <cs:fontRef idx="minor">
-      <a:schemeClr val="tx1"/>
+      <a:schemeClr val="dk1"/>
     </cs:fontRef>
     <cs:spPr>
-      <a:ln w="9525" cap="flat" cmpd="sng" algn="ctr">
+      <a:ln w="9525">
         <a:solidFill>
-          <a:schemeClr val="tx1">
-            <a:lumMod val="35000"/>
-            <a:lumOff val="65000"/>
+          <a:schemeClr val="dk1">
+            <a:lumMod val="50000"/>
+            <a:lumOff val="50000"/>
           </a:schemeClr>
         </a:solidFill>
         <a:round/>
@@ -844,12 +1045,12 @@
     <cs:fillRef idx="0"/>
     <cs:effectRef idx="0"/>
     <cs:fontRef idx="minor">
-      <a:schemeClr val="tx1">
-        <a:lumMod val="65000"/>
-        <a:lumOff val="35000"/>
+      <a:schemeClr val="dk1">
+        <a:lumMod val="75000"/>
+        <a:lumOff val="25000"/>
       </a:schemeClr>
     </cs:fontRef>
-    <cs:defRPr sz="1862" b="0" kern="1200" spc="0" baseline="0"/>
+    <cs:defRPr sz="2200" b="1" kern="1200" baseline="0"/>
   </cs:title>
   <cs:trendline>
     <cs:lnRef idx="0">
@@ -858,14 +1059,13 @@
     <cs:fillRef idx="0"/>
     <cs:effectRef idx="0"/>
     <cs:fontRef idx="minor">
-      <a:schemeClr val="tx1"/>
+      <a:schemeClr val="dk1"/>
     </cs:fontRef>
     <cs:spPr>
       <a:ln w="19050" cap="rnd">
         <a:solidFill>
           <a:schemeClr val="phClr"/>
         </a:solidFill>
-        <a:prstDash val="sysDot"/>
       </a:ln>
     </cs:spPr>
   </cs:trendline>
@@ -874,9 +1074,9 @@
     <cs:fillRef idx="0"/>
     <cs:effectRef idx="0"/>
     <cs:fontRef idx="minor">
-      <a:schemeClr val="tx1">
-        <a:lumMod val="65000"/>
-        <a:lumOff val="35000"/>
+      <a:schemeClr val="dk1">
+        <a:lumMod val="75000"/>
+        <a:lumOff val="25000"/>
       </a:schemeClr>
     </cs:fontRef>
     <cs:defRPr sz="1197" kern="1200"/>
@@ -886,20 +1086,19 @@
     <cs:fillRef idx="0"/>
     <cs:effectRef idx="0"/>
     <cs:fontRef idx="minor">
-      <a:schemeClr val="tx1"/>
+      <a:schemeClr val="dk1"/>
     </cs:fontRef>
     <cs:spPr>
       <a:solidFill>
         <a:schemeClr val="lt1"/>
       </a:solidFill>
-      <a:ln w="9525" cap="flat" cmpd="sng" algn="ctr">
+      <a:ln w="9525">
         <a:solidFill>
-          <a:schemeClr val="tx1">
+          <a:schemeClr val="dk1">
             <a:lumMod val="65000"/>
             <a:lumOff val="35000"/>
           </a:schemeClr>
         </a:solidFill>
-        <a:round/>
       </a:ln>
     </cs:spPr>
   </cs:upBar>
@@ -908,11 +1107,16 @@
     <cs:fillRef idx="0"/>
     <cs:effectRef idx="0"/>
     <cs:fontRef idx="minor">
-      <a:schemeClr val="tx1">
-        <a:lumMod val="65000"/>
-        <a:lumOff val="35000"/>
+      <a:schemeClr val="dk1">
+        <a:lumMod val="75000"/>
+        <a:lumOff val="25000"/>
       </a:schemeClr>
     </cs:fontRef>
+    <cs:spPr>
+      <a:ln>
+        <a:noFill/>
+      </a:ln>
+    </cs:spPr>
     <cs:defRPr sz="1197" kern="1200"/>
   </cs:valueAxis>
   <cs:wall>
@@ -920,14 +1124,8 @@
     <cs:fillRef idx="0"/>
     <cs:effectRef idx="0"/>
     <cs:fontRef idx="minor">
-      <a:schemeClr val="tx1"/>
+      <a:schemeClr val="dk1"/>
     </cs:fontRef>
-    <cs:spPr>
-      <a:noFill/>
-      <a:ln>
-        <a:noFill/>
-      </a:ln>
-    </cs:spPr>
   </cs:wall>
 </cs:chartStyle>
 </file>
@@ -1146,7 +1344,7 @@
             <a:fld id="{B61BEF0D-F0BB-DE4B-95CE-6DB70DBA9567}" type="datetimeFigureOut">
               <a:rPr lang="en-US" dirty="0"/>
               <a:pPr/>
-              <a:t>3/17/2024</a:t>
+              <a:t>3/18/2024</a:t>
             </a:fld>
             <a:endParaRPr lang="en-US" dirty="0"/>
           </a:p>
@@ -1434,7 +1632,7 @@
             <a:fld id="{B61BEF0D-F0BB-DE4B-95CE-6DB70DBA9567}" type="datetimeFigureOut">
               <a:rPr lang="en-US" dirty="0"/>
               <a:pPr/>
-              <a:t>3/17/2024</a:t>
+              <a:t>3/18/2024</a:t>
             </a:fld>
             <a:endParaRPr lang="en-US" dirty="0"/>
           </a:p>
@@ -1690,7 +1888,7 @@
             <a:fld id="{B61BEF0D-F0BB-DE4B-95CE-6DB70DBA9567}" type="datetimeFigureOut">
               <a:rPr lang="en-US" dirty="0"/>
               <a:pPr/>
-              <a:t>3/17/2024</a:t>
+              <a:t>3/18/2024</a:t>
             </a:fld>
             <a:endParaRPr lang="en-US" dirty="0"/>
           </a:p>
@@ -2156,7 +2354,7 @@
             <a:fld id="{B61BEF0D-F0BB-DE4B-95CE-6DB70DBA9567}" type="datetimeFigureOut">
               <a:rPr lang="en-US" dirty="0"/>
               <a:pPr/>
-              <a:t>3/17/2024</a:t>
+              <a:t>3/18/2024</a:t>
             </a:fld>
             <a:endParaRPr lang="en-US" dirty="0"/>
           </a:p>
@@ -2333,7 +2531,7 @@
             <a:fld id="{B61BEF0D-F0BB-DE4B-95CE-6DB70DBA9567}" type="datetimeFigureOut">
               <a:rPr lang="en-US" dirty="0"/>
               <a:pPr/>
-              <a:t>3/17/2024</a:t>
+              <a:t>3/18/2024</a:t>
             </a:fld>
             <a:endParaRPr lang="en-US" dirty="0"/>
           </a:p>
@@ -2906,7 +3104,7 @@
             <a:fld id="{B61BEF0D-F0BB-DE4B-95CE-6DB70DBA9567}" type="datetimeFigureOut">
               <a:rPr lang="en-US" dirty="0"/>
               <a:pPr/>
-              <a:t>3/17/2024</a:t>
+              <a:t>3/18/2024</a:t>
             </a:fld>
             <a:endParaRPr lang="en-US" dirty="0"/>
           </a:p>
@@ -3235,7 +3433,7 @@
             <a:fld id="{B61BEF0D-F0BB-DE4B-95CE-6DB70DBA9567}" type="datetimeFigureOut">
               <a:rPr lang="en-US" dirty="0"/>
               <a:pPr/>
-              <a:t>3/17/2024</a:t>
+              <a:t>3/18/2024</a:t>
             </a:fld>
             <a:endParaRPr lang="en-US" dirty="0"/>
           </a:p>
@@ -3407,7 +3605,7 @@
             <a:fld id="{B61BEF0D-F0BB-DE4B-95CE-6DB70DBA9567}" type="datetimeFigureOut">
               <a:rPr lang="en-US" dirty="0"/>
               <a:pPr/>
-              <a:t>3/17/2024</a:t>
+              <a:t>3/18/2024</a:t>
             </a:fld>
             <a:endParaRPr lang="en-US" dirty="0"/>
           </a:p>
@@ -3584,7 +3782,7 @@
             <a:fld id="{B61BEF0D-F0BB-DE4B-95CE-6DB70DBA9567}" type="datetimeFigureOut">
               <a:rPr lang="en-US" dirty="0"/>
               <a:pPr/>
-              <a:t>3/17/2024</a:t>
+              <a:t>3/18/2024</a:t>
             </a:fld>
             <a:endParaRPr lang="en-US" dirty="0"/>
           </a:p>
@@ -3751,7 +3949,7 @@
             <a:fld id="{B61BEF0D-F0BB-DE4B-95CE-6DB70DBA9567}" type="datetimeFigureOut">
               <a:rPr lang="en-US" dirty="0"/>
               <a:pPr/>
-              <a:t>3/17/2024</a:t>
+              <a:t>3/18/2024</a:t>
             </a:fld>
             <a:endParaRPr lang="en-US" dirty="0"/>
           </a:p>
@@ -4005,7 +4203,7 @@
             <a:fld id="{B61BEF0D-F0BB-DE4B-95CE-6DB70DBA9567}" type="datetimeFigureOut">
               <a:rPr lang="en-US" dirty="0"/>
               <a:pPr/>
-              <a:t>3/17/2024</a:t>
+              <a:t>3/18/2024</a:t>
             </a:fld>
             <a:endParaRPr lang="en-US" dirty="0"/>
           </a:p>
@@ -4294,7 +4492,7 @@
             <a:fld id="{B61BEF0D-F0BB-DE4B-95CE-6DB70DBA9567}" type="datetimeFigureOut">
               <a:rPr lang="en-US" dirty="0"/>
               <a:pPr/>
-              <a:t>3/17/2024</a:t>
+              <a:t>3/18/2024</a:t>
             </a:fld>
             <a:endParaRPr lang="en-US" dirty="0"/>
           </a:p>
@@ -4721,7 +4919,7 @@
             <a:fld id="{B61BEF0D-F0BB-DE4B-95CE-6DB70DBA9567}" type="datetimeFigureOut">
               <a:rPr lang="en-US" dirty="0"/>
               <a:pPr/>
-              <a:t>3/17/2024</a:t>
+              <a:t>3/18/2024</a:t>
             </a:fld>
             <a:endParaRPr lang="en-US" dirty="0"/>
           </a:p>
@@ -4836,7 +5034,7 @@
             <a:fld id="{B61BEF0D-F0BB-DE4B-95CE-6DB70DBA9567}" type="datetimeFigureOut">
               <a:rPr lang="en-US" dirty="0"/>
               <a:pPr/>
-              <a:t>3/17/2024</a:t>
+              <a:t>3/18/2024</a:t>
             </a:fld>
             <a:endParaRPr lang="en-US" dirty="0"/>
           </a:p>
@@ -4928,7 +5126,7 @@
             <a:fld id="{B61BEF0D-F0BB-DE4B-95CE-6DB70DBA9567}" type="datetimeFigureOut">
               <a:rPr lang="en-US" dirty="0"/>
               <a:pPr/>
-              <a:t>3/17/2024</a:t>
+              <a:t>3/18/2024</a:t>
             </a:fld>
             <a:endParaRPr lang="en-US" dirty="0"/>
           </a:p>
@@ -5208,7 +5406,7 @@
             <a:fld id="{B61BEF0D-F0BB-DE4B-95CE-6DB70DBA9567}" type="datetimeFigureOut">
               <a:rPr lang="en-US" dirty="0"/>
               <a:pPr/>
-              <a:t>3/17/2024</a:t>
+              <a:t>3/18/2024</a:t>
             </a:fld>
             <a:endParaRPr lang="en-US" dirty="0"/>
           </a:p>
@@ -5496,7 +5694,7 @@
             <a:fld id="{B61BEF0D-F0BB-DE4B-95CE-6DB70DBA9567}" type="datetimeFigureOut">
               <a:rPr lang="en-US" dirty="0"/>
               <a:pPr/>
-              <a:t>3/17/2024</a:t>
+              <a:t>3/18/2024</a:t>
             </a:fld>
             <a:endParaRPr lang="en-US" dirty="0"/>
           </a:p>
@@ -5724,7 +5922,7 @@
             <a:fld id="{B61BEF0D-F0BB-DE4B-95CE-6DB70DBA9567}" type="datetimeFigureOut">
               <a:rPr lang="en-US" dirty="0"/>
               <a:pPr/>
-              <a:t>3/17/2024</a:t>
+              <a:t>3/18/2024</a:t>
             </a:fld>
             <a:endParaRPr lang="en-US" dirty="0"/>
           </a:p>
@@ -6531,13 +6729,13 @@
           <a:p>
             <a:r>
               <a:rPr lang="ru-RU" dirty="0"/>
-              <a:t>Ронина </a:t>
+              <a:t>Ронина Е.С</a:t>
             </a:r>
           </a:p>
           <a:p>
             <a:r>
               <a:rPr lang="ru-RU" dirty="0"/>
-              <a:t>Дюкова</a:t>
+              <a:t>Дюкова В.В</a:t>
             </a:r>
           </a:p>
         </p:txBody>
@@ -6584,7 +6782,7 @@
           <a:p>
             <a:r>
               <a:rPr lang="ru-RU" dirty="0"/>
-              <a:t>Публика</a:t>
+              <a:t>Аудитория</a:t>
             </a:r>
           </a:p>
         </p:txBody>
@@ -6603,8 +6801,8 @@
         </p:nvSpPr>
         <p:spPr>
           <a:xfrm>
-            <a:off x="192947" y="445735"/>
-            <a:ext cx="4748169" cy="2308324"/>
+            <a:off x="1834391" y="246934"/>
+            <a:ext cx="8523215" cy="1569660"/>
           </a:xfrm>
           <a:prstGeom prst="rect">
             <a:avLst/>
@@ -6653,8 +6851,8 @@
         </p:blipFill>
         <p:spPr bwMode="auto">
           <a:xfrm>
-            <a:off x="5281878" y="445735"/>
-            <a:ext cx="6588544" cy="2811666"/>
+            <a:off x="673525" y="2624022"/>
+            <a:ext cx="7474028" cy="3189547"/>
           </a:xfrm>
           <a:prstGeom prst="rect">
             <a:avLst/>
@@ -6703,6 +6901,52 @@
               <a:rPr lang="ru-RU" dirty="0"/>
               <a:t>Тюмень 2024</a:t>
             </a:r>
+          </a:p>
+        </p:txBody>
+      </p:sp>
+      <p:sp>
+        <p:nvSpPr>
+          <p:cNvPr id="2" name="Улыбающееся лицо 1">
+            <a:extLst>
+              <a:ext uri="{FF2B5EF4-FFF2-40B4-BE49-F238E27FC236}">
+                <a16:creationId xmlns:a16="http://schemas.microsoft.com/office/drawing/2014/main" id="{59AC9DF9-1227-AA3C-3D8B-A97E5FDA2FCE}"/>
+              </a:ext>
+            </a:extLst>
+          </p:cNvPr>
+          <p:cNvSpPr/>
+          <p:nvPr/>
+        </p:nvSpPr>
+        <p:spPr>
+          <a:xfrm>
+            <a:off x="10040223" y="2236044"/>
+            <a:ext cx="1132514" cy="1057012"/>
+          </a:xfrm>
+          <a:prstGeom prst="smileyFace">
+            <a:avLst/>
+          </a:prstGeom>
+        </p:spPr>
+        <p:style>
+          <a:lnRef idx="2">
+            <a:schemeClr val="accent1">
+              <a:shade val="15000"/>
+            </a:schemeClr>
+          </a:lnRef>
+          <a:fillRef idx="1">
+            <a:schemeClr val="accent1"/>
+          </a:fillRef>
+          <a:effectRef idx="0">
+            <a:schemeClr val="accent1"/>
+          </a:effectRef>
+          <a:fontRef idx="minor">
+            <a:schemeClr val="lt1"/>
+          </a:fontRef>
+        </p:style>
+        <p:txBody>
+          <a:bodyPr rtlCol="0" anchor="ctr"/>
+          <a:lstStyle/>
+          <a:p>
+            <a:pPr algn="ctr"/>
+            <a:endParaRPr lang="ru-RU"/>
           </a:p>
         </p:txBody>
       </p:sp>
@@ -6881,7 +7125,7 @@
         <p:spPr>
           <a:xfrm>
             <a:off x="2815904" y="159391"/>
-            <a:ext cx="6560191" cy="461665"/>
+            <a:ext cx="7166995" cy="461665"/>
           </a:xfrm>
           <a:prstGeom prst="rect">
             <a:avLst/>
@@ -6896,7 +7140,7 @@
           <a:p>
             <a:r>
               <a:rPr lang="ru-RU" sz="2400" dirty="0"/>
-              <a:t>Аналитика и статистика использования:</a:t>
+              <a:t>Аналитика и статистика путешественников:</a:t>
             </a:r>
           </a:p>
         </p:txBody>
@@ -6914,7 +7158,7 @@
           <p:nvPr>
             <p:extLst>
               <p:ext uri="{D42A27DB-BD31-4B8C-83A1-F6EECF244321}">
-                <p14:modId xmlns:p14="http://schemas.microsoft.com/office/powerpoint/2010/main" val="2769124206"/>
+                <p14:modId xmlns:p14="http://schemas.microsoft.com/office/powerpoint/2010/main" val="3749643666"/>
               </p:ext>
             </p:extLst>
           </p:nvPr>

</xml_diff>